<commit_message>
Add chapter 2.3 and added schems to tkk
</commit_message>
<xml_diff>
--- a/2023/Диплом/Арск Подруга/Презентация.pptx
+++ b/2023/Диплом/Арск Подруга/Презентация.pptx
@@ -12,7 +12,10 @@
     <p:sldId id="260" r:id="rId6"/>
     <p:sldId id="261" r:id="rId7"/>
     <p:sldId id="262" r:id="rId8"/>
-    <p:sldId id="263" r:id="rId9"/>
+    <p:sldId id="264" r:id="rId9"/>
+    <p:sldId id="265" r:id="rId10"/>
+    <p:sldId id="266" r:id="rId11"/>
+    <p:sldId id="263" r:id="rId12"/>
   </p:sldIdLst>
   <p:sldSz cx="12192000" cy="6858000"/>
   <p:notesSz cx="6858000" cy="9144000"/>
@@ -111,6 +114,11 @@
       </a:defRPr>
     </a:lvl9pPr>
   </p:defaultTextStyle>
+  <p:extLst>
+    <p:ext uri="{EFAFB233-063F-42B5-8137-9DF3F51BA10A}">
+      <p15:sldGuideLst xmlns:p15="http://schemas.microsoft.com/office/powerpoint/2012/main"/>
+    </p:ext>
+  </p:extLst>
 </p:presentation>
 </file>
 
@@ -199,6 +207,11 @@
               </a:ln>
               <a:effectLst/>
             </c:spPr>
+            <c:extLst>
+              <c:ext xmlns:c16="http://schemas.microsoft.com/office/drawing/2014/chart" uri="{C3380CC4-5D6E-409C-BE32-E72D297353CC}">
+                <c16:uniqueId val="{00000001-3513-4137-96AF-05A12E1A8D3A}"/>
+              </c:ext>
+            </c:extLst>
           </c:dPt>
           <c:dPt>
             <c:idx val="1"/>
@@ -214,6 +227,11 @@
               </a:ln>
               <a:effectLst/>
             </c:spPr>
+            <c:extLst>
+              <c:ext xmlns:c16="http://schemas.microsoft.com/office/drawing/2014/chart" uri="{C3380CC4-5D6E-409C-BE32-E72D297353CC}">
+                <c16:uniqueId val="{00000003-3513-4137-96AF-05A12E1A8D3A}"/>
+              </c:ext>
+            </c:extLst>
           </c:dPt>
           <c:dPt>
             <c:idx val="2"/>
@@ -229,6 +247,11 @@
               </a:ln>
               <a:effectLst/>
             </c:spPr>
+            <c:extLst>
+              <c:ext xmlns:c16="http://schemas.microsoft.com/office/drawing/2014/chart" uri="{C3380CC4-5D6E-409C-BE32-E72D297353CC}">
+                <c16:uniqueId val="{00000005-3513-4137-96AF-05A12E1A8D3A}"/>
+              </c:ext>
+            </c:extLst>
           </c:dPt>
           <c:dPt>
             <c:idx val="3"/>
@@ -244,6 +267,11 @@
               </a:ln>
               <a:effectLst/>
             </c:spPr>
+            <c:extLst>
+              <c:ext xmlns:c16="http://schemas.microsoft.com/office/drawing/2014/chart" uri="{C3380CC4-5D6E-409C-BE32-E72D297353CC}">
+                <c16:uniqueId val="{00000007-3513-4137-96AF-05A12E1A8D3A}"/>
+              </c:ext>
+            </c:extLst>
           </c:dPt>
           <c:cat>
             <c:strRef>
@@ -251,16 +279,16 @@
               <c:strCache>
                 <c:ptCount val="4"/>
                 <c:pt idx="0">
-                  <c:v>Беш кебаб</c:v>
+                  <c:v>Шашлык из говядины</c:v>
                 </c:pt>
                 <c:pt idx="1">
-                  <c:v>Уч-панжа из баранины</c:v>
+                  <c:v>Шашлык из баранины</c:v>
                 </c:pt>
                 <c:pt idx="2">
-                  <c:v>Дорадо на углях</c:v>
+                  <c:v>Шашлык из курицы</c:v>
                 </c:pt>
                 <c:pt idx="3">
-                  <c:v>Каре ягнёнка с цуккини</c:v>
+                  <c:v>Шашлык из ягнёнка</c:v>
                 </c:pt>
               </c:strCache>
             </c:strRef>
@@ -317,8 +345,8 @@
         <c:manualLayout>
           <c:xMode val="edge"/>
           <c:yMode val="edge"/>
-          <c:x val="0.62517110841913992"/>
-          <c:y val="5.7037025224714669E-2"/>
+          <c:x val="0.61363264688067842"/>
+          <c:y val="1.6755696170189523E-2"/>
           <c:w val="0.36457248132444986"/>
           <c:h val="0.92018647749868443"/>
         </c:manualLayout>
@@ -988,7 +1016,7 @@
           <a:noFill/>
           <a:extLst>
             <a:ext uri="{909E8E84-426E-40dd-AFC4-6F175D3DCCD1}">
-              <a14:hiddenFill xmlns:a14="http://schemas.microsoft.com/office/drawing/2010/main" xmlns="">
+              <a14:hiddenFill xmlns="" xmlns:a14="http://schemas.microsoft.com/office/drawing/2010/main">
                 <a:solidFill>
                   <a:srgbClr val="FFFFFF"/>
                 </a:solidFill>
@@ -1048,7 +1076,7 @@
             </a:ln>
             <a:extLst>
               <a:ext uri="{91240B29-F687-4f45-9708-019B960494DF}">
-                <a14:hiddenLine xmlns:a14="http://schemas.microsoft.com/office/drawing/2010/main" xmlns="" w="9525">
+                <a14:hiddenLine xmlns="" xmlns:a14="http://schemas.microsoft.com/office/drawing/2010/main" w="9525">
                   <a:solidFill>
                     <a:srgbClr val="000000"/>
                   </a:solidFill>
@@ -1138,7 +1166,7 @@
             </a:ln>
             <a:extLst>
               <a:ext uri="{91240B29-F687-4f45-9708-019B960494DF}">
-                <a14:hiddenLine xmlns:a14="http://schemas.microsoft.com/office/drawing/2010/main" xmlns="" w="9525">
+                <a14:hiddenLine xmlns="" xmlns:a14="http://schemas.microsoft.com/office/drawing/2010/main" w="9525">
                   <a:solidFill>
                     <a:srgbClr val="000000"/>
                   </a:solidFill>
@@ -1228,7 +1256,7 @@
             </a:ln>
             <a:extLst>
               <a:ext uri="{91240B29-F687-4f45-9708-019B960494DF}">
-                <a14:hiddenLine xmlns:a14="http://schemas.microsoft.com/office/drawing/2010/main" xmlns="" w="9525">
+                <a14:hiddenLine xmlns="" xmlns:a14="http://schemas.microsoft.com/office/drawing/2010/main" w="9525">
                   <a:solidFill>
                     <a:srgbClr val="000000"/>
                   </a:solidFill>
@@ -1262,7 +1290,7 @@
             </a:ln>
             <a:extLst>
               <a:ext uri="{91240B29-F687-4f45-9708-019B960494DF}">
-                <a14:hiddenLine xmlns:a14="http://schemas.microsoft.com/office/drawing/2010/main" xmlns="" w="9525">
+                <a14:hiddenLine xmlns="" xmlns:a14="http://schemas.microsoft.com/office/drawing/2010/main" w="9525">
                   <a:solidFill>
                     <a:srgbClr val="000000"/>
                   </a:solidFill>
@@ -1352,7 +1380,7 @@
             </a:ln>
             <a:extLst>
               <a:ext uri="{91240B29-F687-4f45-9708-019B960494DF}">
-                <a14:hiddenLine xmlns:a14="http://schemas.microsoft.com/office/drawing/2010/main" xmlns="" w="9525">
+                <a14:hiddenLine xmlns="" xmlns:a14="http://schemas.microsoft.com/office/drawing/2010/main" w="9525">
                   <a:solidFill>
                     <a:srgbClr val="000000"/>
                   </a:solidFill>
@@ -1414,7 +1442,7 @@
             </a:ln>
             <a:extLst>
               <a:ext uri="{91240B29-F687-4f45-9708-019B960494DF}">
-                <a14:hiddenLine xmlns:a14="http://schemas.microsoft.com/office/drawing/2010/main" xmlns="" w="9525">
+                <a14:hiddenLine xmlns="" xmlns:a14="http://schemas.microsoft.com/office/drawing/2010/main" w="9525">
                   <a:solidFill>
                     <a:srgbClr val="000000"/>
                   </a:solidFill>
@@ -1476,7 +1504,7 @@
             </a:ln>
             <a:extLst>
               <a:ext uri="{91240B29-F687-4f45-9708-019B960494DF}">
-                <a14:hiddenLine xmlns:a14="http://schemas.microsoft.com/office/drawing/2010/main" xmlns="" w="9525">
+                <a14:hiddenLine xmlns="" xmlns:a14="http://schemas.microsoft.com/office/drawing/2010/main" w="9525">
                   <a:solidFill>
                     <a:srgbClr val="000000"/>
                   </a:solidFill>
@@ -1566,7 +1594,7 @@
             </a:ln>
             <a:extLst>
               <a:ext uri="{91240B29-F687-4f45-9708-019B960494DF}">
-                <a14:hiddenLine xmlns:a14="http://schemas.microsoft.com/office/drawing/2010/main" xmlns="" w="9525">
+                <a14:hiddenLine xmlns="" xmlns:a14="http://schemas.microsoft.com/office/drawing/2010/main" w="9525">
                   <a:solidFill>
                     <a:srgbClr val="000000"/>
                   </a:solidFill>
@@ -1628,7 +1656,7 @@
             </a:ln>
             <a:extLst>
               <a:ext uri="{91240B29-F687-4f45-9708-019B960494DF}">
-                <a14:hiddenLine xmlns:a14="http://schemas.microsoft.com/office/drawing/2010/main" xmlns="" w="9525">
+                <a14:hiddenLine xmlns="" xmlns:a14="http://schemas.microsoft.com/office/drawing/2010/main" w="9525">
                   <a:solidFill>
                     <a:srgbClr val="000000"/>
                   </a:solidFill>
@@ -1690,7 +1718,7 @@
             </a:ln>
             <a:extLst>
               <a:ext uri="{91240B29-F687-4f45-9708-019B960494DF}">
-                <a14:hiddenLine xmlns:a14="http://schemas.microsoft.com/office/drawing/2010/main" xmlns="" w="9525">
+                <a14:hiddenLine xmlns="" xmlns:a14="http://schemas.microsoft.com/office/drawing/2010/main" w="9525">
                   <a:solidFill>
                     <a:srgbClr val="000000"/>
                   </a:solidFill>
@@ -1780,7 +1808,7 @@
             </a:ln>
             <a:extLst>
               <a:ext uri="{91240B29-F687-4f45-9708-019B960494DF}">
-                <a14:hiddenLine xmlns:a14="http://schemas.microsoft.com/office/drawing/2010/main" xmlns="" w="9525">
+                <a14:hiddenLine xmlns="" xmlns:a14="http://schemas.microsoft.com/office/drawing/2010/main" w="9525">
                   <a:solidFill>
                     <a:srgbClr val="000000"/>
                   </a:solidFill>
@@ -1870,7 +1898,7 @@
             </a:ln>
             <a:extLst>
               <a:ext uri="{91240B29-F687-4f45-9708-019B960494DF}">
-                <a14:hiddenLine xmlns:a14="http://schemas.microsoft.com/office/drawing/2010/main" xmlns="" w="9525">
+                <a14:hiddenLine xmlns="" xmlns:a14="http://schemas.microsoft.com/office/drawing/2010/main" w="9525">
                   <a:solidFill>
                     <a:srgbClr val="000000"/>
                   </a:solidFill>
@@ -1932,7 +1960,7 @@
             </a:ln>
             <a:extLst>
               <a:ext uri="{91240B29-F687-4f45-9708-019B960494DF}">
-                <a14:hiddenLine xmlns:a14="http://schemas.microsoft.com/office/drawing/2010/main" xmlns="" w="9525">
+                <a14:hiddenLine xmlns="" xmlns:a14="http://schemas.microsoft.com/office/drawing/2010/main" w="9525">
                   <a:solidFill>
                     <a:srgbClr val="000000"/>
                   </a:solidFill>
@@ -2042,7 +2070,7 @@
             </a:ln>
             <a:extLst>
               <a:ext uri="{91240B29-F687-4f45-9708-019B960494DF}">
-                <a14:hiddenLine xmlns:a14="http://schemas.microsoft.com/office/drawing/2010/main" xmlns="" w="9525">
+                <a14:hiddenLine xmlns="" xmlns:a14="http://schemas.microsoft.com/office/drawing/2010/main" w="9525">
                   <a:solidFill>
                     <a:srgbClr val="000000"/>
                   </a:solidFill>
@@ -2104,7 +2132,7 @@
             </a:ln>
             <a:extLst>
               <a:ext uri="{91240B29-F687-4f45-9708-019B960494DF}">
-                <a14:hiddenLine xmlns:a14="http://schemas.microsoft.com/office/drawing/2010/main" xmlns="" w="9525">
+                <a14:hiddenLine xmlns="" xmlns:a14="http://schemas.microsoft.com/office/drawing/2010/main" w="9525">
                   <a:solidFill>
                     <a:srgbClr val="000000"/>
                   </a:solidFill>
@@ -2194,7 +2222,7 @@
             </a:ln>
             <a:extLst>
               <a:ext uri="{91240B29-F687-4f45-9708-019B960494DF}">
-                <a14:hiddenLine xmlns:a14="http://schemas.microsoft.com/office/drawing/2010/main" xmlns="" w="9525">
+                <a14:hiddenLine xmlns="" xmlns:a14="http://schemas.microsoft.com/office/drawing/2010/main" w="9525">
                   <a:solidFill>
                     <a:srgbClr val="000000"/>
                   </a:solidFill>
@@ -2284,7 +2312,7 @@
             </a:ln>
             <a:extLst>
               <a:ext uri="{91240B29-F687-4f45-9708-019B960494DF}">
-                <a14:hiddenLine xmlns:a14="http://schemas.microsoft.com/office/drawing/2010/main" xmlns="" w="9525">
+                <a14:hiddenLine xmlns="" xmlns:a14="http://schemas.microsoft.com/office/drawing/2010/main" w="9525">
                   <a:solidFill>
                     <a:srgbClr val="000000"/>
                   </a:solidFill>
@@ -2346,7 +2374,7 @@
             </a:ln>
             <a:extLst>
               <a:ext uri="{91240B29-F687-4f45-9708-019B960494DF}">
-                <a14:hiddenLine xmlns:a14="http://schemas.microsoft.com/office/drawing/2010/main" xmlns="" w="9525">
+                <a14:hiddenLine xmlns="" xmlns:a14="http://schemas.microsoft.com/office/drawing/2010/main" w="9525">
                   <a:solidFill>
                     <a:srgbClr val="000000"/>
                   </a:solidFill>
@@ -2436,7 +2464,7 @@
             </a:ln>
             <a:extLst>
               <a:ext uri="{91240B29-F687-4f45-9708-019B960494DF}">
-                <a14:hiddenLine xmlns:a14="http://schemas.microsoft.com/office/drawing/2010/main" xmlns="" w="9525">
+                <a14:hiddenLine xmlns="" xmlns:a14="http://schemas.microsoft.com/office/drawing/2010/main" w="9525">
                   <a:solidFill>
                     <a:srgbClr val="000000"/>
                   </a:solidFill>
@@ -2526,7 +2554,7 @@
             </a:ln>
             <a:extLst>
               <a:ext uri="{91240B29-F687-4f45-9708-019B960494DF}">
-                <a14:hiddenLine xmlns:a14="http://schemas.microsoft.com/office/drawing/2010/main" xmlns="" w="9525">
+                <a14:hiddenLine xmlns="" xmlns:a14="http://schemas.microsoft.com/office/drawing/2010/main" w="9525">
                   <a:solidFill>
                     <a:srgbClr val="000000"/>
                   </a:solidFill>
@@ -2582,7 +2610,7 @@
             </a:ln>
             <a:extLst>
               <a:ext uri="{91240B29-F687-4f45-9708-019B960494DF}">
-                <a14:hiddenLine xmlns:a14="http://schemas.microsoft.com/office/drawing/2010/main" xmlns="" w="9525">
+                <a14:hiddenLine xmlns="" xmlns:a14="http://schemas.microsoft.com/office/drawing/2010/main" w="9525">
                   <a:solidFill>
                     <a:srgbClr val="000000"/>
                   </a:solidFill>
@@ -2672,7 +2700,7 @@
             </a:ln>
             <a:extLst>
               <a:ext uri="{91240B29-F687-4f45-9708-019B960494DF}">
-                <a14:hiddenLine xmlns:a14="http://schemas.microsoft.com/office/drawing/2010/main" xmlns="" w="9525">
+                <a14:hiddenLine xmlns="" xmlns:a14="http://schemas.microsoft.com/office/drawing/2010/main" w="9525">
                   <a:solidFill>
                     <a:srgbClr val="000000"/>
                   </a:solidFill>
@@ -2728,7 +2756,7 @@
             </a:ln>
             <a:extLst>
               <a:ext uri="{91240B29-F687-4f45-9708-019B960494DF}">
-                <a14:hiddenLine xmlns:a14="http://schemas.microsoft.com/office/drawing/2010/main" xmlns="" w="9525">
+                <a14:hiddenLine xmlns="" xmlns:a14="http://schemas.microsoft.com/office/drawing/2010/main" w="9525">
                   <a:solidFill>
                     <a:srgbClr val="000000"/>
                   </a:solidFill>
@@ -2818,7 +2846,7 @@
             </a:ln>
             <a:extLst>
               <a:ext uri="{91240B29-F687-4f45-9708-019B960494DF}">
-                <a14:hiddenLine xmlns:a14="http://schemas.microsoft.com/office/drawing/2010/main" xmlns="" w="9525">
+                <a14:hiddenLine xmlns="" xmlns:a14="http://schemas.microsoft.com/office/drawing/2010/main" w="9525">
                   <a:solidFill>
                     <a:srgbClr val="000000"/>
                   </a:solidFill>
@@ -2886,7 +2914,7 @@
             </a:ln>
             <a:extLst>
               <a:ext uri="{91240B29-F687-4f45-9708-019B960494DF}">
-                <a14:hiddenLine xmlns:a14="http://schemas.microsoft.com/office/drawing/2010/main" xmlns="" w="9525">
+                <a14:hiddenLine xmlns="" xmlns:a14="http://schemas.microsoft.com/office/drawing/2010/main" w="9525">
                   <a:solidFill>
                     <a:srgbClr val="000000"/>
                   </a:solidFill>
@@ -2976,7 +3004,7 @@
             </a:ln>
             <a:extLst>
               <a:ext uri="{91240B29-F687-4f45-9708-019B960494DF}">
-                <a14:hiddenLine xmlns:a14="http://schemas.microsoft.com/office/drawing/2010/main" xmlns="" w="9525">
+                <a14:hiddenLine xmlns="" xmlns:a14="http://schemas.microsoft.com/office/drawing/2010/main" w="9525">
                   <a:solidFill>
                     <a:srgbClr val="000000"/>
                   </a:solidFill>
@@ -3044,7 +3072,7 @@
             </a:ln>
             <a:extLst>
               <a:ext uri="{91240B29-F687-4f45-9708-019B960494DF}">
-                <a14:hiddenLine xmlns:a14="http://schemas.microsoft.com/office/drawing/2010/main" xmlns="" w="9525">
+                <a14:hiddenLine xmlns="" xmlns:a14="http://schemas.microsoft.com/office/drawing/2010/main" w="9525">
                   <a:solidFill>
                     <a:srgbClr val="000000"/>
                   </a:solidFill>
@@ -3134,7 +3162,7 @@
             </a:ln>
             <a:extLst>
               <a:ext uri="{91240B29-F687-4f45-9708-019B960494DF}">
-                <a14:hiddenLine xmlns:a14="http://schemas.microsoft.com/office/drawing/2010/main" xmlns="" w="9525">
+                <a14:hiddenLine xmlns="" xmlns:a14="http://schemas.microsoft.com/office/drawing/2010/main" w="9525">
                   <a:solidFill>
                     <a:srgbClr val="000000"/>
                   </a:solidFill>
@@ -3168,7 +3196,7 @@
             </a:ln>
             <a:extLst>
               <a:ext uri="{91240B29-F687-4f45-9708-019B960494DF}">
-                <a14:hiddenLine xmlns:a14="http://schemas.microsoft.com/office/drawing/2010/main" xmlns="" w="9525">
+                <a14:hiddenLine xmlns="" xmlns:a14="http://schemas.microsoft.com/office/drawing/2010/main" w="9525">
                   <a:solidFill>
                     <a:srgbClr val="000000"/>
                   </a:solidFill>
@@ -3258,7 +3286,7 @@
             </a:ln>
             <a:extLst>
               <a:ext uri="{91240B29-F687-4f45-9708-019B960494DF}">
-                <a14:hiddenLine xmlns:a14="http://schemas.microsoft.com/office/drawing/2010/main" xmlns="" w="9525">
+                <a14:hiddenLine xmlns="" xmlns:a14="http://schemas.microsoft.com/office/drawing/2010/main" w="9525">
                   <a:solidFill>
                     <a:srgbClr val="000000"/>
                   </a:solidFill>
@@ -3320,7 +3348,7 @@
             </a:ln>
             <a:extLst>
               <a:ext uri="{91240B29-F687-4f45-9708-019B960494DF}">
-                <a14:hiddenLine xmlns:a14="http://schemas.microsoft.com/office/drawing/2010/main" xmlns="" w="9525">
+                <a14:hiddenLine xmlns="" xmlns:a14="http://schemas.microsoft.com/office/drawing/2010/main" w="9525">
                   <a:solidFill>
                     <a:srgbClr val="000000"/>
                   </a:solidFill>
@@ -3382,7 +3410,7 @@
             </a:ln>
             <a:extLst>
               <a:ext uri="{91240B29-F687-4f45-9708-019B960494DF}">
-                <a14:hiddenLine xmlns:a14="http://schemas.microsoft.com/office/drawing/2010/main" xmlns="" w="9525">
+                <a14:hiddenLine xmlns="" xmlns:a14="http://schemas.microsoft.com/office/drawing/2010/main" w="9525">
                   <a:solidFill>
                     <a:srgbClr val="000000"/>
                   </a:solidFill>
@@ -3472,7 +3500,7 @@
             </a:ln>
             <a:extLst>
               <a:ext uri="{91240B29-F687-4f45-9708-019B960494DF}">
-                <a14:hiddenLine xmlns:a14="http://schemas.microsoft.com/office/drawing/2010/main" xmlns="" w="9525">
+                <a14:hiddenLine xmlns="" xmlns:a14="http://schemas.microsoft.com/office/drawing/2010/main" w="9525">
                   <a:solidFill>
                     <a:srgbClr val="000000"/>
                   </a:solidFill>
@@ -3540,7 +3568,7 @@
             </a:ln>
             <a:extLst>
               <a:ext uri="{91240B29-F687-4f45-9708-019B960494DF}">
-                <a14:hiddenLine xmlns:a14="http://schemas.microsoft.com/office/drawing/2010/main" xmlns="" w="9525">
+                <a14:hiddenLine xmlns="" xmlns:a14="http://schemas.microsoft.com/office/drawing/2010/main" w="9525">
                   <a:solidFill>
                     <a:srgbClr val="000000"/>
                   </a:solidFill>
@@ -3602,7 +3630,7 @@
             </a:ln>
             <a:extLst>
               <a:ext uri="{91240B29-F687-4f45-9708-019B960494DF}">
-                <a14:hiddenLine xmlns:a14="http://schemas.microsoft.com/office/drawing/2010/main" xmlns="" w="9525">
+                <a14:hiddenLine xmlns="" xmlns:a14="http://schemas.microsoft.com/office/drawing/2010/main" w="9525">
                   <a:solidFill>
                     <a:srgbClr val="000000"/>
                   </a:solidFill>
@@ -3692,7 +3720,7 @@
             </a:ln>
             <a:extLst>
               <a:ext uri="{91240B29-F687-4f45-9708-019B960494DF}">
-                <a14:hiddenLine xmlns:a14="http://schemas.microsoft.com/office/drawing/2010/main" xmlns="" w="9525">
+                <a14:hiddenLine xmlns="" xmlns:a14="http://schemas.microsoft.com/office/drawing/2010/main" w="9525">
                   <a:solidFill>
                     <a:srgbClr val="000000"/>
                   </a:solidFill>
@@ -3754,7 +3782,7 @@
             </a:ln>
             <a:extLst>
               <a:ext uri="{91240B29-F687-4f45-9708-019B960494DF}">
-                <a14:hiddenLine xmlns:a14="http://schemas.microsoft.com/office/drawing/2010/main" xmlns="" w="9525">
+                <a14:hiddenLine xmlns="" xmlns:a14="http://schemas.microsoft.com/office/drawing/2010/main" w="9525">
                   <a:solidFill>
                     <a:srgbClr val="000000"/>
                   </a:solidFill>
@@ -3844,7 +3872,7 @@
             </a:ln>
             <a:extLst>
               <a:ext uri="{91240B29-F687-4f45-9708-019B960494DF}">
-                <a14:hiddenLine xmlns:a14="http://schemas.microsoft.com/office/drawing/2010/main" xmlns="" w="9525">
+                <a14:hiddenLine xmlns="" xmlns:a14="http://schemas.microsoft.com/office/drawing/2010/main" w="9525">
                   <a:solidFill>
                     <a:srgbClr val="000000"/>
                   </a:solidFill>
@@ -3906,7 +3934,7 @@
             </a:ln>
             <a:extLst>
               <a:ext uri="{91240B29-F687-4f45-9708-019B960494DF}">
-                <a14:hiddenLine xmlns:a14="http://schemas.microsoft.com/office/drawing/2010/main" xmlns="" w="9525">
+                <a14:hiddenLine xmlns="" xmlns:a14="http://schemas.microsoft.com/office/drawing/2010/main" w="9525">
                   <a:solidFill>
                     <a:srgbClr val="000000"/>
                   </a:solidFill>
@@ -3996,7 +4024,7 @@
             </a:ln>
             <a:extLst>
               <a:ext uri="{91240B29-F687-4f45-9708-019B960494DF}">
-                <a14:hiddenLine xmlns:a14="http://schemas.microsoft.com/office/drawing/2010/main" xmlns="" w="9525">
+                <a14:hiddenLine xmlns="" xmlns:a14="http://schemas.microsoft.com/office/drawing/2010/main" w="9525">
                   <a:solidFill>
                     <a:srgbClr val="000000"/>
                   </a:solidFill>
@@ -4030,7 +4058,7 @@
             </a:ln>
             <a:extLst>
               <a:ext uri="{91240B29-F687-4f45-9708-019B960494DF}">
-                <a14:hiddenLine xmlns:a14="http://schemas.microsoft.com/office/drawing/2010/main" xmlns="" w="9525">
+                <a14:hiddenLine xmlns="" xmlns:a14="http://schemas.microsoft.com/office/drawing/2010/main" w="9525">
                   <a:solidFill>
                     <a:srgbClr val="000000"/>
                   </a:solidFill>
@@ -4095,7 +4123,7 @@
             </a:ln>
             <a:extLst>
               <a:ext uri="{91240B29-F687-4f45-9708-019B960494DF}">
-                <a14:hiddenLine xmlns:a14="http://schemas.microsoft.com/office/drawing/2010/main" xmlns="" w="9525">
+                <a14:hiddenLine xmlns="" xmlns:a14="http://schemas.microsoft.com/office/drawing/2010/main" w="9525">
                   <a:solidFill>
                     <a:srgbClr val="000000"/>
                   </a:solidFill>
@@ -4185,7 +4213,7 @@
             </a:ln>
             <a:extLst>
               <a:ext uri="{91240B29-F687-4f45-9708-019B960494DF}">
-                <a14:hiddenLine xmlns:a14="http://schemas.microsoft.com/office/drawing/2010/main" xmlns="" w="9525">
+                <a14:hiddenLine xmlns="" xmlns:a14="http://schemas.microsoft.com/office/drawing/2010/main" w="9525">
                   <a:solidFill>
                     <a:srgbClr val="000000"/>
                   </a:solidFill>
@@ -4247,7 +4275,7 @@
             </a:ln>
             <a:extLst>
               <a:ext uri="{91240B29-F687-4f45-9708-019B960494DF}">
-                <a14:hiddenLine xmlns:a14="http://schemas.microsoft.com/office/drawing/2010/main" xmlns="" w="9525">
+                <a14:hiddenLine xmlns="" xmlns:a14="http://schemas.microsoft.com/office/drawing/2010/main" w="9525">
                   <a:solidFill>
                     <a:srgbClr val="000000"/>
                   </a:solidFill>
@@ -4337,7 +4365,7 @@
             </a:ln>
             <a:extLst>
               <a:ext uri="{91240B29-F687-4f45-9708-019B960494DF}">
-                <a14:hiddenLine xmlns:a14="http://schemas.microsoft.com/office/drawing/2010/main" xmlns="" w="9525">
+                <a14:hiddenLine xmlns="" xmlns:a14="http://schemas.microsoft.com/office/drawing/2010/main" w="9525">
                   <a:solidFill>
                     <a:srgbClr val="000000"/>
                   </a:solidFill>
@@ -4427,7 +4455,7 @@
             </a:ln>
             <a:extLst>
               <a:ext uri="{91240B29-F687-4f45-9708-019B960494DF}">
-                <a14:hiddenLine xmlns:a14="http://schemas.microsoft.com/office/drawing/2010/main" xmlns="" w="9525">
+                <a14:hiddenLine xmlns="" xmlns:a14="http://schemas.microsoft.com/office/drawing/2010/main" w="9525">
                   <a:solidFill>
                     <a:srgbClr val="000000"/>
                   </a:solidFill>
@@ -4492,7 +4520,7 @@
             </a:ln>
             <a:extLst>
               <a:ext uri="{91240B29-F687-4f45-9708-019B960494DF}">
-                <a14:hiddenLine xmlns:a14="http://schemas.microsoft.com/office/drawing/2010/main" xmlns="" w="9525">
+                <a14:hiddenLine xmlns="" xmlns:a14="http://schemas.microsoft.com/office/drawing/2010/main" w="9525">
                   <a:solidFill>
                     <a:srgbClr val="000000"/>
                   </a:solidFill>
@@ -4554,7 +4582,7 @@
             </a:ln>
             <a:extLst>
               <a:ext uri="{91240B29-F687-4f45-9708-019B960494DF}">
-                <a14:hiddenLine xmlns:a14="http://schemas.microsoft.com/office/drawing/2010/main" xmlns="" w="9525">
+                <a14:hiddenLine xmlns="" xmlns:a14="http://schemas.microsoft.com/office/drawing/2010/main" w="9525">
                   <a:solidFill>
                     <a:srgbClr val="000000"/>
                   </a:solidFill>
@@ -4644,7 +4672,7 @@
             </a:ln>
             <a:extLst>
               <a:ext uri="{91240B29-F687-4f45-9708-019B960494DF}">
-                <a14:hiddenLine xmlns:a14="http://schemas.microsoft.com/office/drawing/2010/main" xmlns="" w="9525">
+                <a14:hiddenLine xmlns="" xmlns:a14="http://schemas.microsoft.com/office/drawing/2010/main" w="9525">
                   <a:solidFill>
                     <a:srgbClr val="000000"/>
                   </a:solidFill>
@@ -4734,7 +4762,7 @@
             </a:ln>
             <a:extLst>
               <a:ext uri="{91240B29-F687-4f45-9708-019B960494DF}">
-                <a14:hiddenLine xmlns:a14="http://schemas.microsoft.com/office/drawing/2010/main" xmlns="" w="9525">
+                <a14:hiddenLine xmlns="" xmlns:a14="http://schemas.microsoft.com/office/drawing/2010/main" w="9525">
                   <a:solidFill>
                     <a:srgbClr val="000000"/>
                   </a:solidFill>
@@ -4796,7 +4824,7 @@
             </a:ln>
             <a:extLst>
               <a:ext uri="{91240B29-F687-4f45-9708-019B960494DF}">
-                <a14:hiddenLine xmlns:a14="http://schemas.microsoft.com/office/drawing/2010/main" xmlns="" w="9525">
+                <a14:hiddenLine xmlns="" xmlns:a14="http://schemas.microsoft.com/office/drawing/2010/main" w="9525">
                   <a:solidFill>
                     <a:srgbClr val="000000"/>
                   </a:solidFill>
@@ -4916,7 +4944,7 @@
             </a:ln>
             <a:extLst>
               <a:ext uri="{91240B29-F687-4f45-9708-019B960494DF}">
-                <a14:hiddenLine xmlns:a14="http://schemas.microsoft.com/office/drawing/2010/main" xmlns="" w="9525">
+                <a14:hiddenLine xmlns="" xmlns:a14="http://schemas.microsoft.com/office/drawing/2010/main" w="9525">
                   <a:solidFill>
                     <a:srgbClr val="000000"/>
                   </a:solidFill>
@@ -4984,7 +5012,7 @@
             </a:ln>
             <a:extLst>
               <a:ext uri="{91240B29-F687-4f45-9708-019B960494DF}">
-                <a14:hiddenLine xmlns:a14="http://schemas.microsoft.com/office/drawing/2010/main" xmlns="" w="9525">
+                <a14:hiddenLine xmlns="" xmlns:a14="http://schemas.microsoft.com/office/drawing/2010/main" w="9525">
                   <a:solidFill>
                     <a:srgbClr val="000000"/>
                   </a:solidFill>
@@ -5074,7 +5102,7 @@
             </a:ln>
             <a:extLst>
               <a:ext uri="{91240B29-F687-4f45-9708-019B960494DF}">
-                <a14:hiddenLine xmlns:a14="http://schemas.microsoft.com/office/drawing/2010/main" xmlns="" w="9525">
+                <a14:hiddenLine xmlns="" xmlns:a14="http://schemas.microsoft.com/office/drawing/2010/main" w="9525">
                   <a:solidFill>
                     <a:srgbClr val="000000"/>
                   </a:solidFill>
@@ -5214,7 +5242,7 @@
           <a:p>
             <a:fld id="{21307E79-EC31-48CD-9E48-653B106E2268}" type="datetimeFigureOut">
               <a:rPr lang="ru-RU" smtClean="0"/>
-              <a:t>03.06.2023</a:t>
+              <a:t>16.06.2023</a:t>
             </a:fld>
             <a:endParaRPr lang="ru-RU"/>
           </a:p>
@@ -5481,7 +5509,7 @@
           <a:p>
             <a:fld id="{21307E79-EC31-48CD-9E48-653B106E2268}" type="datetimeFigureOut">
               <a:rPr lang="ru-RU" smtClean="0"/>
-              <a:t>03.06.2023</a:t>
+              <a:t>16.06.2023</a:t>
             </a:fld>
             <a:endParaRPr lang="ru-RU"/>
           </a:p>
@@ -5677,7 +5705,7 @@
           <a:p>
             <a:fld id="{21307E79-EC31-48CD-9E48-653B106E2268}" type="datetimeFigureOut">
               <a:rPr lang="ru-RU" smtClean="0"/>
-              <a:t>03.06.2023</a:t>
+              <a:t>16.06.2023</a:t>
             </a:fld>
             <a:endParaRPr lang="ru-RU"/>
           </a:p>
@@ -5940,7 +5968,7 @@
           <a:p>
             <a:fld id="{21307E79-EC31-48CD-9E48-653B106E2268}" type="datetimeFigureOut">
               <a:rPr lang="ru-RU" smtClean="0"/>
-              <a:t>03.06.2023</a:t>
+              <a:t>16.06.2023</a:t>
             </a:fld>
             <a:endParaRPr lang="ru-RU"/>
           </a:p>
@@ -6374,7 +6402,7 @@
           <a:p>
             <a:fld id="{21307E79-EC31-48CD-9E48-653B106E2268}" type="datetimeFigureOut">
               <a:rPr lang="ru-RU" smtClean="0"/>
-              <a:t>03.06.2023</a:t>
+              <a:t>16.06.2023</a:t>
             </a:fld>
             <a:endParaRPr lang="ru-RU"/>
           </a:p>
@@ -6920,7 +6948,7 @@
           <a:p>
             <a:fld id="{21307E79-EC31-48CD-9E48-653B106E2268}" type="datetimeFigureOut">
               <a:rPr lang="ru-RU" smtClean="0"/>
-              <a:t>03.06.2023</a:t>
+              <a:t>16.06.2023</a:t>
             </a:fld>
             <a:endParaRPr lang="ru-RU"/>
           </a:p>
@@ -7640,7 +7668,7 @@
           <a:p>
             <a:fld id="{21307E79-EC31-48CD-9E48-653B106E2268}" type="datetimeFigureOut">
               <a:rPr lang="ru-RU" smtClean="0"/>
-              <a:t>03.06.2023</a:t>
+              <a:t>16.06.2023</a:t>
             </a:fld>
             <a:endParaRPr lang="ru-RU"/>
           </a:p>
@@ -7810,7 +7838,7 @@
           <a:p>
             <a:fld id="{21307E79-EC31-48CD-9E48-653B106E2268}" type="datetimeFigureOut">
               <a:rPr lang="ru-RU" smtClean="0"/>
-              <a:t>03.06.2023</a:t>
+              <a:t>16.06.2023</a:t>
             </a:fld>
             <a:endParaRPr lang="ru-RU"/>
           </a:p>
@@ -7990,7 +8018,7 @@
           <a:p>
             <a:fld id="{21307E79-EC31-48CD-9E48-653B106E2268}" type="datetimeFigureOut">
               <a:rPr lang="ru-RU" smtClean="0"/>
-              <a:t>03.06.2023</a:t>
+              <a:t>16.06.2023</a:t>
             </a:fld>
             <a:endParaRPr lang="ru-RU"/>
           </a:p>
@@ -8160,7 +8188,7 @@
           <a:p>
             <a:fld id="{21307E79-EC31-48CD-9E48-653B106E2268}" type="datetimeFigureOut">
               <a:rPr lang="ru-RU" smtClean="0"/>
-              <a:t>03.06.2023</a:t>
+              <a:t>16.06.2023</a:t>
             </a:fld>
             <a:endParaRPr lang="ru-RU"/>
           </a:p>
@@ -8410,7 +8438,7 @@
           <a:p>
             <a:fld id="{21307E79-EC31-48CD-9E48-653B106E2268}" type="datetimeFigureOut">
               <a:rPr lang="ru-RU" smtClean="0"/>
-              <a:t>03.06.2023</a:t>
+              <a:t>16.06.2023</a:t>
             </a:fld>
             <a:endParaRPr lang="ru-RU"/>
           </a:p>
@@ -8642,7 +8670,7 @@
           <a:p>
             <a:fld id="{21307E79-EC31-48CD-9E48-653B106E2268}" type="datetimeFigureOut">
               <a:rPr lang="ru-RU" smtClean="0"/>
-              <a:t>03.06.2023</a:t>
+              <a:t>16.06.2023</a:t>
             </a:fld>
             <a:endParaRPr lang="ru-RU"/>
           </a:p>
@@ -9023,7 +9051,7 @@
           <a:p>
             <a:fld id="{21307E79-EC31-48CD-9E48-653B106E2268}" type="datetimeFigureOut">
               <a:rPr lang="ru-RU" smtClean="0"/>
-              <a:t>03.06.2023</a:t>
+              <a:t>16.06.2023</a:t>
             </a:fld>
             <a:endParaRPr lang="ru-RU"/>
           </a:p>
@@ -9141,7 +9169,7 @@
           <a:p>
             <a:fld id="{21307E79-EC31-48CD-9E48-653B106E2268}" type="datetimeFigureOut">
               <a:rPr lang="ru-RU" smtClean="0"/>
-              <a:t>03.06.2023</a:t>
+              <a:t>16.06.2023</a:t>
             </a:fld>
             <a:endParaRPr lang="ru-RU"/>
           </a:p>
@@ -9236,7 +9264,7 @@
           <a:p>
             <a:fld id="{21307E79-EC31-48CD-9E48-653B106E2268}" type="datetimeFigureOut">
               <a:rPr lang="ru-RU" smtClean="0"/>
-              <a:t>03.06.2023</a:t>
+              <a:t>16.06.2023</a:t>
             </a:fld>
             <a:endParaRPr lang="ru-RU"/>
           </a:p>
@@ -9485,7 +9513,7 @@
           <a:p>
             <a:fld id="{21307E79-EC31-48CD-9E48-653B106E2268}" type="datetimeFigureOut">
               <a:rPr lang="ru-RU" smtClean="0"/>
-              <a:t>03.06.2023</a:t>
+              <a:t>16.06.2023</a:t>
             </a:fld>
             <a:endParaRPr lang="ru-RU"/>
           </a:p>
@@ -9765,7 +9793,7 @@
           <a:p>
             <a:fld id="{21307E79-EC31-48CD-9E48-653B106E2268}" type="datetimeFigureOut">
               <a:rPr lang="ru-RU" smtClean="0"/>
-              <a:t>03.06.2023</a:t>
+              <a:t>16.06.2023</a:t>
             </a:fld>
             <a:endParaRPr lang="ru-RU"/>
           </a:p>
@@ -9881,7 +9909,7 @@
           <a:noFill/>
           <a:extLst>
             <a:ext uri="{909E8E84-426E-40dd-AFC4-6F175D3DCCD1}">
-              <a14:hiddenFill xmlns:a14="http://schemas.microsoft.com/office/drawing/2010/main" xmlns="">
+              <a14:hiddenFill xmlns="" xmlns:a14="http://schemas.microsoft.com/office/drawing/2010/main">
                 <a:solidFill>
                   <a:srgbClr val="FFFFFF"/>
                 </a:solidFill>
@@ -9955,7 +9983,7 @@
               </a:ln>
               <a:extLst>
                 <a:ext uri="{91240B29-F687-4f45-9708-019B960494DF}">
-                  <a14:hiddenLine xmlns:a14="http://schemas.microsoft.com/office/drawing/2010/main" xmlns="" w="9525">
+                  <a14:hiddenLine xmlns="" xmlns:a14="http://schemas.microsoft.com/office/drawing/2010/main" w="9525">
                     <a:solidFill>
                       <a:srgbClr val="000000"/>
                     </a:solidFill>
@@ -10045,7 +10073,7 @@
               </a:ln>
               <a:extLst>
                 <a:ext uri="{91240B29-F687-4f45-9708-019B960494DF}">
-                  <a14:hiddenLine xmlns:a14="http://schemas.microsoft.com/office/drawing/2010/main" xmlns="" w="9525">
+                  <a14:hiddenLine xmlns="" xmlns:a14="http://schemas.microsoft.com/office/drawing/2010/main" w="9525">
                     <a:solidFill>
                       <a:srgbClr val="000000"/>
                     </a:solidFill>
@@ -10135,7 +10163,7 @@
               </a:ln>
               <a:extLst>
                 <a:ext uri="{91240B29-F687-4f45-9708-019B960494DF}">
-                  <a14:hiddenLine xmlns:a14="http://schemas.microsoft.com/office/drawing/2010/main" xmlns="" w="9525">
+                  <a14:hiddenLine xmlns="" xmlns:a14="http://schemas.microsoft.com/office/drawing/2010/main" w="9525">
                     <a:solidFill>
                       <a:srgbClr val="000000"/>
                     </a:solidFill>
@@ -10197,7 +10225,7 @@
               </a:ln>
               <a:extLst>
                 <a:ext uri="{91240B29-F687-4f45-9708-019B960494DF}">
-                  <a14:hiddenLine xmlns:a14="http://schemas.microsoft.com/office/drawing/2010/main" xmlns="" w="9525">
+                  <a14:hiddenLine xmlns="" xmlns:a14="http://schemas.microsoft.com/office/drawing/2010/main" w="9525">
                     <a:solidFill>
                       <a:srgbClr val="000000"/>
                     </a:solidFill>
@@ -10287,7 +10315,7 @@
               </a:ln>
               <a:extLst>
                 <a:ext uri="{91240B29-F687-4f45-9708-019B960494DF}">
-                  <a14:hiddenLine xmlns:a14="http://schemas.microsoft.com/office/drawing/2010/main" xmlns="" w="9525">
+                  <a14:hiddenLine xmlns="" xmlns:a14="http://schemas.microsoft.com/office/drawing/2010/main" w="9525">
                     <a:solidFill>
                       <a:srgbClr val="000000"/>
                     </a:solidFill>
@@ -10349,7 +10377,7 @@
               </a:ln>
               <a:extLst>
                 <a:ext uri="{91240B29-F687-4f45-9708-019B960494DF}">
-                  <a14:hiddenLine xmlns:a14="http://schemas.microsoft.com/office/drawing/2010/main" xmlns="" w="9525">
+                  <a14:hiddenLine xmlns="" xmlns:a14="http://schemas.microsoft.com/office/drawing/2010/main" w="9525">
                     <a:solidFill>
                       <a:srgbClr val="000000"/>
                     </a:solidFill>
@@ -10411,7 +10439,7 @@
               </a:ln>
               <a:extLst>
                 <a:ext uri="{91240B29-F687-4f45-9708-019B960494DF}">
-                  <a14:hiddenLine xmlns:a14="http://schemas.microsoft.com/office/drawing/2010/main" xmlns="" w="9525">
+                  <a14:hiddenLine xmlns="" xmlns:a14="http://schemas.microsoft.com/office/drawing/2010/main" w="9525">
                     <a:solidFill>
                       <a:srgbClr val="000000"/>
                     </a:solidFill>
@@ -10501,7 +10529,7 @@
               </a:ln>
               <a:extLst>
                 <a:ext uri="{91240B29-F687-4f45-9708-019B960494DF}">
-                  <a14:hiddenLine xmlns:a14="http://schemas.microsoft.com/office/drawing/2010/main" xmlns="" w="9525">
+                  <a14:hiddenLine xmlns="" xmlns:a14="http://schemas.microsoft.com/office/drawing/2010/main" w="9525">
                     <a:solidFill>
                       <a:srgbClr val="000000"/>
                     </a:solidFill>
@@ -10591,7 +10619,7 @@
               </a:ln>
               <a:extLst>
                 <a:ext uri="{91240B29-F687-4f45-9708-019B960494DF}">
-                  <a14:hiddenLine xmlns:a14="http://schemas.microsoft.com/office/drawing/2010/main" xmlns="" w="9525">
+                  <a14:hiddenLine xmlns="" xmlns:a14="http://schemas.microsoft.com/office/drawing/2010/main" w="9525">
                     <a:solidFill>
                       <a:srgbClr val="000000"/>
                     </a:solidFill>
@@ -10653,7 +10681,7 @@
               </a:ln>
               <a:extLst>
                 <a:ext uri="{91240B29-F687-4f45-9708-019B960494DF}">
-                  <a14:hiddenLine xmlns:a14="http://schemas.microsoft.com/office/drawing/2010/main" xmlns="" w="9525">
+                  <a14:hiddenLine xmlns="" xmlns:a14="http://schemas.microsoft.com/office/drawing/2010/main" w="9525">
                     <a:solidFill>
                       <a:srgbClr val="000000"/>
                     </a:solidFill>
@@ -10763,7 +10791,7 @@
               </a:ln>
               <a:extLst>
                 <a:ext uri="{91240B29-F687-4f45-9708-019B960494DF}">
-                  <a14:hiddenLine xmlns:a14="http://schemas.microsoft.com/office/drawing/2010/main" xmlns="" w="9525">
+                  <a14:hiddenLine xmlns="" xmlns:a14="http://schemas.microsoft.com/office/drawing/2010/main" w="9525">
                     <a:solidFill>
                       <a:srgbClr val="000000"/>
                     </a:solidFill>
@@ -10847,7 +10875,7 @@
               </a:ln>
               <a:extLst>
                 <a:ext uri="{91240B29-F687-4f45-9708-019B960494DF}">
-                  <a14:hiddenLine xmlns:a14="http://schemas.microsoft.com/office/drawing/2010/main" xmlns="" w="9525">
+                  <a14:hiddenLine xmlns="" xmlns:a14="http://schemas.microsoft.com/office/drawing/2010/main" w="9525">
                     <a:solidFill>
                       <a:srgbClr val="000000"/>
                     </a:solidFill>
@@ -10909,7 +10937,7 @@
               </a:ln>
               <a:extLst>
                 <a:ext uri="{91240B29-F687-4f45-9708-019B960494DF}">
-                  <a14:hiddenLine xmlns:a14="http://schemas.microsoft.com/office/drawing/2010/main" xmlns="" w="9525">
+                  <a14:hiddenLine xmlns="" xmlns:a14="http://schemas.microsoft.com/office/drawing/2010/main" w="9525">
                     <a:solidFill>
                       <a:srgbClr val="000000"/>
                     </a:solidFill>
@@ -10971,7 +10999,7 @@
               </a:ln>
               <a:extLst>
                 <a:ext uri="{91240B29-F687-4f45-9708-019B960494DF}">
-                  <a14:hiddenLine xmlns:a14="http://schemas.microsoft.com/office/drawing/2010/main" xmlns="" w="9525">
+                  <a14:hiddenLine xmlns="" xmlns:a14="http://schemas.microsoft.com/office/drawing/2010/main" w="9525">
                     <a:solidFill>
                       <a:srgbClr val="000000"/>
                     </a:solidFill>
@@ -11061,7 +11089,7 @@
               </a:ln>
               <a:extLst>
                 <a:ext uri="{91240B29-F687-4f45-9708-019B960494DF}">
-                  <a14:hiddenLine xmlns:a14="http://schemas.microsoft.com/office/drawing/2010/main" xmlns="" w="9525">
+                  <a14:hiddenLine xmlns="" xmlns:a14="http://schemas.microsoft.com/office/drawing/2010/main" w="9525">
                     <a:solidFill>
                       <a:srgbClr val="000000"/>
                     </a:solidFill>
@@ -11095,7 +11123,7 @@
               </a:ln>
               <a:extLst>
                 <a:ext uri="{91240B29-F687-4f45-9708-019B960494DF}">
-                  <a14:hiddenLine xmlns:a14="http://schemas.microsoft.com/office/drawing/2010/main" xmlns="" w="9525">
+                  <a14:hiddenLine xmlns="" xmlns:a14="http://schemas.microsoft.com/office/drawing/2010/main" w="9525">
                     <a:solidFill>
                       <a:srgbClr val="000000"/>
                     </a:solidFill>
@@ -11160,7 +11188,7 @@
               </a:ln>
               <a:extLst>
                 <a:ext uri="{91240B29-F687-4f45-9708-019B960494DF}">
-                  <a14:hiddenLine xmlns:a14="http://schemas.microsoft.com/office/drawing/2010/main" xmlns="" w="9525">
+                  <a14:hiddenLine xmlns="" xmlns:a14="http://schemas.microsoft.com/office/drawing/2010/main" w="9525">
                     <a:solidFill>
                       <a:srgbClr val="000000"/>
                     </a:solidFill>
@@ -11250,7 +11278,7 @@
               </a:ln>
               <a:extLst>
                 <a:ext uri="{91240B29-F687-4f45-9708-019B960494DF}">
-                  <a14:hiddenLine xmlns:a14="http://schemas.microsoft.com/office/drawing/2010/main" xmlns="" w="9525">
+                  <a14:hiddenLine xmlns="" xmlns:a14="http://schemas.microsoft.com/office/drawing/2010/main" w="9525">
                     <a:solidFill>
                       <a:srgbClr val="000000"/>
                     </a:solidFill>
@@ -11312,7 +11340,7 @@
               </a:ln>
               <a:extLst>
                 <a:ext uri="{91240B29-F687-4f45-9708-019B960494DF}">
-                  <a14:hiddenLine xmlns:a14="http://schemas.microsoft.com/office/drawing/2010/main" xmlns="" w="9525">
+                  <a14:hiddenLine xmlns="" xmlns:a14="http://schemas.microsoft.com/office/drawing/2010/main" w="9525">
                     <a:solidFill>
                       <a:srgbClr val="000000"/>
                     </a:solidFill>
@@ -11402,7 +11430,7 @@
               </a:ln>
               <a:extLst>
                 <a:ext uri="{91240B29-F687-4f45-9708-019B960494DF}">
-                  <a14:hiddenLine xmlns:a14="http://schemas.microsoft.com/office/drawing/2010/main" xmlns="" w="9525">
+                  <a14:hiddenLine xmlns="" xmlns:a14="http://schemas.microsoft.com/office/drawing/2010/main" w="9525">
                     <a:solidFill>
                       <a:srgbClr val="000000"/>
                     </a:solidFill>
@@ -11467,7 +11495,7 @@
               </a:ln>
               <a:extLst>
                 <a:ext uri="{91240B29-F687-4f45-9708-019B960494DF}">
-                  <a14:hiddenLine xmlns:a14="http://schemas.microsoft.com/office/drawing/2010/main" xmlns="" w="9525">
+                  <a14:hiddenLine xmlns="" xmlns:a14="http://schemas.microsoft.com/office/drawing/2010/main" w="9525">
                     <a:solidFill>
                       <a:srgbClr val="000000"/>
                     </a:solidFill>
@@ -11529,7 +11557,7 @@
               </a:ln>
               <a:extLst>
                 <a:ext uri="{91240B29-F687-4f45-9708-019B960494DF}">
-                  <a14:hiddenLine xmlns:a14="http://schemas.microsoft.com/office/drawing/2010/main" xmlns="" w="9525">
+                  <a14:hiddenLine xmlns="" xmlns:a14="http://schemas.microsoft.com/office/drawing/2010/main" w="9525">
                     <a:solidFill>
                       <a:srgbClr val="000000"/>
                     </a:solidFill>
@@ -11619,7 +11647,7 @@
               </a:ln>
               <a:extLst>
                 <a:ext uri="{91240B29-F687-4f45-9708-019B960494DF}">
-                  <a14:hiddenLine xmlns:a14="http://schemas.microsoft.com/office/drawing/2010/main" xmlns="" w="9525">
+                  <a14:hiddenLine xmlns="" xmlns:a14="http://schemas.microsoft.com/office/drawing/2010/main" w="9525">
                     <a:solidFill>
                       <a:srgbClr val="000000"/>
                     </a:solidFill>
@@ -11709,7 +11737,7 @@
               </a:ln>
               <a:extLst>
                 <a:ext uri="{91240B29-F687-4f45-9708-019B960494DF}">
-                  <a14:hiddenLine xmlns:a14="http://schemas.microsoft.com/office/drawing/2010/main" xmlns="" w="9525">
+                  <a14:hiddenLine xmlns="" xmlns:a14="http://schemas.microsoft.com/office/drawing/2010/main" w="9525">
                     <a:solidFill>
                       <a:srgbClr val="000000"/>
                     </a:solidFill>
@@ -11774,7 +11802,7 @@
               </a:ln>
               <a:extLst>
                 <a:ext uri="{91240B29-F687-4f45-9708-019B960494DF}">
-                  <a14:hiddenLine xmlns:a14="http://schemas.microsoft.com/office/drawing/2010/main" xmlns="" w="9525">
+                  <a14:hiddenLine xmlns="" xmlns:a14="http://schemas.microsoft.com/office/drawing/2010/main" w="9525">
                     <a:solidFill>
                       <a:srgbClr val="000000"/>
                     </a:solidFill>
@@ -11894,7 +11922,7 @@
               </a:ln>
               <a:extLst>
                 <a:ext uri="{91240B29-F687-4f45-9708-019B960494DF}">
-                  <a14:hiddenLine xmlns:a14="http://schemas.microsoft.com/office/drawing/2010/main" xmlns="" w="9525">
+                  <a14:hiddenLine xmlns="" xmlns:a14="http://schemas.microsoft.com/office/drawing/2010/main" w="9525">
                     <a:solidFill>
                       <a:srgbClr val="000000"/>
                     </a:solidFill>
@@ -11992,7 +12020,7 @@
               </a:ln>
               <a:extLst>
                 <a:ext uri="{91240B29-F687-4f45-9708-019B960494DF}">
-                  <a14:hiddenLine xmlns:a14="http://schemas.microsoft.com/office/drawing/2010/main" xmlns="" w="9525">
+                  <a14:hiddenLine xmlns="" xmlns:a14="http://schemas.microsoft.com/office/drawing/2010/main" w="9525">
                     <a:solidFill>
                       <a:srgbClr val="000000"/>
                     </a:solidFill>
@@ -12107,7 +12135,7 @@
               </a:ln>
               <a:extLst>
                 <a:ext uri="{91240B29-F687-4f45-9708-019B960494DF}">
-                  <a14:hiddenLine xmlns:a14="http://schemas.microsoft.com/office/drawing/2010/main" xmlns="" w="9525">
+                  <a14:hiddenLine xmlns="" xmlns:a14="http://schemas.microsoft.com/office/drawing/2010/main" w="9525">
                     <a:solidFill>
                       <a:srgbClr val="000000"/>
                     </a:solidFill>
@@ -12197,7 +12225,7 @@
               </a:ln>
               <a:extLst>
                 <a:ext uri="{91240B29-F687-4f45-9708-019B960494DF}">
-                  <a14:hiddenLine xmlns:a14="http://schemas.microsoft.com/office/drawing/2010/main" xmlns="" w="9525">
+                  <a14:hiddenLine xmlns="" xmlns:a14="http://schemas.microsoft.com/office/drawing/2010/main" w="9525">
                     <a:solidFill>
                       <a:srgbClr val="000000"/>
                     </a:solidFill>
@@ -12262,7 +12290,7 @@
               </a:ln>
               <a:extLst>
                 <a:ext uri="{91240B29-F687-4f45-9708-019B960494DF}">
-                  <a14:hiddenLine xmlns:a14="http://schemas.microsoft.com/office/drawing/2010/main" xmlns="" w="9525">
+                  <a14:hiddenLine xmlns="" xmlns:a14="http://schemas.microsoft.com/office/drawing/2010/main" w="9525">
                     <a:solidFill>
                       <a:srgbClr val="000000"/>
                     </a:solidFill>
@@ -12352,7 +12380,7 @@
               </a:ln>
               <a:extLst>
                 <a:ext uri="{91240B29-F687-4f45-9708-019B960494DF}">
-                  <a14:hiddenLine xmlns:a14="http://schemas.microsoft.com/office/drawing/2010/main" xmlns="" w="9525">
+                  <a14:hiddenLine xmlns="" xmlns:a14="http://schemas.microsoft.com/office/drawing/2010/main" w="9525">
                     <a:solidFill>
                       <a:srgbClr val="000000"/>
                     </a:solidFill>
@@ -12420,7 +12448,7 @@
               </a:ln>
               <a:extLst>
                 <a:ext uri="{91240B29-F687-4f45-9708-019B960494DF}">
-                  <a14:hiddenLine xmlns:a14="http://schemas.microsoft.com/office/drawing/2010/main" xmlns="" w="9525">
+                  <a14:hiddenLine xmlns="" xmlns:a14="http://schemas.microsoft.com/office/drawing/2010/main" w="9525">
                     <a:solidFill>
                       <a:srgbClr val="000000"/>
                     </a:solidFill>
@@ -12510,7 +12538,7 @@
               </a:ln>
               <a:extLst>
                 <a:ext uri="{91240B29-F687-4f45-9708-019B960494DF}">
-                  <a14:hiddenLine xmlns:a14="http://schemas.microsoft.com/office/drawing/2010/main" xmlns="" w="9525">
+                  <a14:hiddenLine xmlns="" xmlns:a14="http://schemas.microsoft.com/office/drawing/2010/main" w="9525">
                     <a:solidFill>
                       <a:srgbClr val="000000"/>
                     </a:solidFill>
@@ -12578,7 +12606,7 @@
               </a:ln>
               <a:extLst>
                 <a:ext uri="{91240B29-F687-4f45-9708-019B960494DF}">
-                  <a14:hiddenLine xmlns:a14="http://schemas.microsoft.com/office/drawing/2010/main" xmlns="" w="9525">
+                  <a14:hiddenLine xmlns="" xmlns:a14="http://schemas.microsoft.com/office/drawing/2010/main" w="9525">
                     <a:solidFill>
                       <a:srgbClr val="000000"/>
                     </a:solidFill>
@@ -12668,7 +12696,7 @@
               </a:ln>
               <a:extLst>
                 <a:ext uri="{91240B29-F687-4f45-9708-019B960494DF}">
-                  <a14:hiddenLine xmlns:a14="http://schemas.microsoft.com/office/drawing/2010/main" xmlns="" w="9525">
+                  <a14:hiddenLine xmlns="" xmlns:a14="http://schemas.microsoft.com/office/drawing/2010/main" w="9525">
                     <a:solidFill>
                       <a:srgbClr val="000000"/>
                     </a:solidFill>
@@ -12702,7 +12730,7 @@
               </a:ln>
               <a:extLst>
                 <a:ext uri="{91240B29-F687-4f45-9708-019B960494DF}">
-                  <a14:hiddenLine xmlns:a14="http://schemas.microsoft.com/office/drawing/2010/main" xmlns="" w="9525">
+                  <a14:hiddenLine xmlns="" xmlns:a14="http://schemas.microsoft.com/office/drawing/2010/main" w="9525">
                     <a:solidFill>
                       <a:srgbClr val="000000"/>
                     </a:solidFill>
@@ -12842,7 +12870,7 @@
           <a:p>
             <a:fld id="{21307E79-EC31-48CD-9E48-653B106E2268}" type="datetimeFigureOut">
               <a:rPr lang="ru-RU" smtClean="0"/>
-              <a:t>03.06.2023</a:t>
+              <a:t>16.06.2023</a:t>
             </a:fld>
             <a:endParaRPr lang="ru-RU"/>
           </a:p>
@@ -13286,7 +13314,7 @@
           <a:p>
             <a:r>
               <a:rPr lang="ru-RU" dirty="0" smtClean="0"/>
-              <a:t>Дипломный проект:</a:t>
+              <a:t>Дипломная работа:</a:t>
             </a:r>
             <a:r>
               <a:rPr lang="ru-RU" dirty="0"/>
@@ -13348,6 +13376,182 @@
     <p:extLst>
       <p:ext uri="{BB962C8B-B14F-4D97-AF65-F5344CB8AC3E}">
         <p14:creationId xmlns:p14="http://schemas.microsoft.com/office/powerpoint/2010/main" val="457181486"/>
+      </p:ext>
+    </p:extLst>
+  </p:cSld>
+  <p:clrMapOvr>
+    <a:masterClrMapping/>
+  </p:clrMapOvr>
+</p:sld>
+</file>
+
+<file path=ppt/slides/slide10.xml><?xml version="1.0" encoding="utf-8"?>
+<p:sld xmlns:a="http://schemas.openxmlformats.org/drawingml/2006/main" xmlns:r="http://schemas.openxmlformats.org/officeDocument/2006/relationships" xmlns:p="http://schemas.openxmlformats.org/presentationml/2006/main">
+  <p:cSld>
+    <p:spTree>
+      <p:nvGrpSpPr>
+        <p:cNvPr id="1" name=""/>
+        <p:cNvGrpSpPr/>
+        <p:nvPr/>
+      </p:nvGrpSpPr>
+      <p:grpSpPr>
+        <a:xfrm>
+          <a:off x="0" y="0"/>
+          <a:ext cx="0" cy="0"/>
+          <a:chOff x="0" y="0"/>
+          <a:chExt cx="0" cy="0"/>
+        </a:xfrm>
+      </p:grpSpPr>
+      <p:sp>
+        <p:nvSpPr>
+          <p:cNvPr id="2" name="Заголовок 1"/>
+          <p:cNvSpPr>
+            <a:spLocks noGrp="1"/>
+          </p:cNvSpPr>
+          <p:nvPr>
+            <p:ph type="title"/>
+          </p:nvPr>
+        </p:nvSpPr>
+        <p:spPr>
+          <a:xfrm>
+            <a:off x="749226" y="369136"/>
+            <a:ext cx="10690369" cy="1057882"/>
+          </a:xfrm>
+        </p:spPr>
+        <p:txBody>
+          <a:bodyPr>
+            <a:normAutofit fontScale="90000"/>
+          </a:bodyPr>
+          <a:lstStyle/>
+          <a:p>
+            <a:r>
+              <a:rPr lang="ru-RU" dirty="0">
+                <a:solidFill>
+                  <a:schemeClr val="bg1"/>
+                </a:solidFill>
+                <a:latin typeface="Times New Roman" panose="02020603050405020304" pitchFamily="18" charset="0"/>
+                <a:cs typeface="Times New Roman" panose="02020603050405020304" pitchFamily="18" charset="0"/>
+              </a:rPr>
+              <a:t>ТЕХНОЛОГИЧЕСКИХ СХЕМ ПРИГОТОВЛЕНИЯ </a:t>
+            </a:r>
+            <a:r>
+              <a:rPr lang="ru-RU" dirty="0" smtClean="0">
+                <a:solidFill>
+                  <a:schemeClr val="bg1"/>
+                </a:solidFill>
+                <a:latin typeface="Times New Roman" panose="02020603050405020304" pitchFamily="18" charset="0"/>
+                <a:cs typeface="Times New Roman" panose="02020603050405020304" pitchFamily="18" charset="0"/>
+              </a:rPr>
+              <a:t>Шашлыка из ягнёнка</a:t>
+            </a:r>
+            <a:endParaRPr lang="ru-RU" dirty="0"/>
+          </a:p>
+        </p:txBody>
+      </p:sp>
+      <p:pic>
+        <p:nvPicPr>
+          <p:cNvPr id="5" name="Объект 4" descr="ТЕХНОЛОГИЧЕСКАЯ КАРТА №7. Наименование блюда (изделия) Рыба запеченная с  помидорами, ТЕХНОЛОГИЧЕСКАЯ КАРТА №8. Наименование блюда (изделия)  Креветки, запеченные под молочным соусом - Организация работы рыбного  ресторана высшего класса в г. Саранске"/>
+          <p:cNvPicPr>
+            <a:picLocks noGrp="1"/>
+          </p:cNvPicPr>
+          <p:nvPr>
+            <p:ph idx="1"/>
+          </p:nvPr>
+        </p:nvPicPr>
+        <p:blipFill>
+          <a:blip r:embed="rId2">
+            <a:extLst>
+              <a:ext uri="{28A0092B-C50C-407E-A947-70E740481C1C}">
+                <a14:useLocalDpi xmlns:a14="http://schemas.microsoft.com/office/drawing/2010/main" val="0"/>
+              </a:ext>
+            </a:extLst>
+          </a:blip>
+          <a:srcRect/>
+          <a:stretch>
+            <a:fillRect/>
+          </a:stretch>
+        </p:blipFill>
+        <p:spPr bwMode="auto">
+          <a:xfrm>
+            <a:off x="1361888" y="1427018"/>
+            <a:ext cx="9465044" cy="5320146"/>
+          </a:xfrm>
+          <a:prstGeom prst="rect">
+            <a:avLst/>
+          </a:prstGeom>
+          <a:noFill/>
+          <a:ln>
+            <a:noFill/>
+          </a:ln>
+        </p:spPr>
+      </p:pic>
+    </p:spTree>
+    <p:extLst>
+      <p:ext uri="{BB962C8B-B14F-4D97-AF65-F5344CB8AC3E}">
+        <p14:creationId xmlns:p14="http://schemas.microsoft.com/office/powerpoint/2010/main" val="1501715023"/>
+      </p:ext>
+    </p:extLst>
+  </p:cSld>
+  <p:clrMapOvr>
+    <a:masterClrMapping/>
+  </p:clrMapOvr>
+</p:sld>
+</file>
+
+<file path=ppt/slides/slide11.xml><?xml version="1.0" encoding="utf-8"?>
+<p:sld xmlns:a="http://schemas.openxmlformats.org/drawingml/2006/main" xmlns:r="http://schemas.openxmlformats.org/officeDocument/2006/relationships" xmlns:p="http://schemas.openxmlformats.org/presentationml/2006/main">
+  <p:cSld>
+    <p:spTree>
+      <p:nvGrpSpPr>
+        <p:cNvPr id="1" name=""/>
+        <p:cNvGrpSpPr/>
+        <p:nvPr/>
+      </p:nvGrpSpPr>
+      <p:grpSpPr>
+        <a:xfrm>
+          <a:off x="0" y="0"/>
+          <a:ext cx="0" cy="0"/>
+          <a:chOff x="0" y="0"/>
+          <a:chExt cx="0" cy="0"/>
+        </a:xfrm>
+      </p:grpSpPr>
+      <p:sp>
+        <p:nvSpPr>
+          <p:cNvPr id="2" name="Заголовок 1"/>
+          <p:cNvSpPr>
+            <a:spLocks noGrp="1"/>
+          </p:cNvSpPr>
+          <p:nvPr>
+            <p:ph type="title"/>
+          </p:nvPr>
+        </p:nvSpPr>
+        <p:spPr>
+          <a:xfrm>
+            <a:off x="282429" y="1967346"/>
+            <a:ext cx="11909571" cy="1681162"/>
+          </a:xfrm>
+        </p:spPr>
+        <p:txBody>
+          <a:bodyPr>
+            <a:normAutofit/>
+          </a:bodyPr>
+          <a:lstStyle/>
+          <a:p>
+            <a:r>
+              <a:rPr lang="ru-RU" sz="7200" dirty="0">
+                <a:latin typeface="Times New Roman" panose="02020603050405020304" pitchFamily="18" charset="0"/>
+                <a:cs typeface="Times New Roman" panose="02020603050405020304" pitchFamily="18" charset="0"/>
+              </a:rPr>
+              <a:t>СПАСИБО ЗА ПРОСМОТР!</a:t>
+            </a:r>
+            <a:endParaRPr lang="ru-RU" sz="7200" dirty="0"/>
+          </a:p>
+        </p:txBody>
+      </p:sp>
+    </p:spTree>
+    <p:extLst>
+      <p:ext uri="{BB962C8B-B14F-4D97-AF65-F5344CB8AC3E}">
+        <p14:creationId xmlns:p14="http://schemas.microsoft.com/office/powerpoint/2010/main" val="3590306646"/>
       </p:ext>
     </p:extLst>
   </p:cSld>
@@ -13477,13 +13681,6 @@
               </a:rPr>
               <a:t>НОВЫЕ ВИДА ОБОРУДОВАНИЯ И ИХ ТЕХНИКА БЕЗОПАСНОСТИ</a:t>
             </a:r>
-            <a:endParaRPr lang="ru-RU" sz="3600" dirty="0" smtClean="0">
-              <a:solidFill>
-                <a:schemeClr val="bg1"/>
-              </a:solidFill>
-              <a:latin typeface="Times New Roman" panose="02020603050405020304" pitchFamily="18" charset="0"/>
-              <a:cs typeface="Times New Roman" panose="02020603050405020304" pitchFamily="18" charset="0"/>
-            </a:endParaRPr>
           </a:p>
           <a:p>
             <a:pPr marL="285750" indent="-285750">
@@ -13610,7 +13807,7 @@
         </p:spPr>
         <p:txBody>
           <a:bodyPr>
-            <a:normAutofit/>
+            <a:normAutofit fontScale="90000"/>
           </a:bodyPr>
           <a:lstStyle/>
           <a:p>
@@ -13623,7 +13820,7 @@
                 <a:latin typeface="Times New Roman" panose="02020603050405020304" pitchFamily="18" charset="0"/>
                 <a:cs typeface="Times New Roman" panose="02020603050405020304" pitchFamily="18" charset="0"/>
               </a:rPr>
-              <a:t>Ресторан </a:t>
+              <a:t>Закусочная-шашлычная </a:t>
             </a:r>
             <a:r>
               <a:rPr lang="ru-RU" sz="4400" dirty="0">
@@ -14131,7 +14328,7 @@
             <p:ph idx="1"/>
             <p:extLst>
               <p:ext uri="{D42A27DB-BD31-4B8C-83A1-F6EECF244321}">
-                <p14:modId xmlns:p14="http://schemas.microsoft.com/office/powerpoint/2010/main" val="3589918294"/>
+                <p14:modId xmlns:p14="http://schemas.microsoft.com/office/powerpoint/2010/main" val="37669569"/>
               </p:ext>
             </p:extLst>
           </p:nvPr>
@@ -14216,7 +14413,7 @@
                 <a:latin typeface="Times New Roman" panose="02020603050405020304" pitchFamily="18" charset="0"/>
                 <a:cs typeface="Times New Roman" panose="02020603050405020304" pitchFamily="18" charset="0"/>
               </a:rPr>
-              <a:t>БЛЮД</a:t>
+              <a:t>Шашлыка из говядины</a:t>
             </a:r>
             <a:endParaRPr lang="ru-RU" dirty="0"/>
           </a:p>
@@ -14301,8 +14498,121 @@
         </p:nvSpPr>
         <p:spPr>
           <a:xfrm>
-            <a:off x="282429" y="1967346"/>
-            <a:ext cx="11909571" cy="1681162"/>
+            <a:off x="499845" y="1432070"/>
+            <a:ext cx="5554592" cy="1809894"/>
+          </a:xfrm>
+        </p:spPr>
+        <p:txBody>
+          <a:bodyPr>
+            <a:normAutofit fontScale="90000"/>
+          </a:bodyPr>
+          <a:lstStyle/>
+          <a:p>
+            <a:r>
+              <a:rPr lang="ru-RU" dirty="0">
+                <a:solidFill>
+                  <a:schemeClr val="bg1"/>
+                </a:solidFill>
+                <a:latin typeface="Times New Roman" panose="02020603050405020304" pitchFamily="18" charset="0"/>
+                <a:cs typeface="Times New Roman" panose="02020603050405020304" pitchFamily="18" charset="0"/>
+              </a:rPr>
+              <a:t>ТЕХНОЛОГИЧЕСКИХ СХЕМ ПРИГОТОВЛЕНИЯ </a:t>
+            </a:r>
+            <a:r>
+              <a:rPr lang="ru-RU" dirty="0" smtClean="0">
+                <a:solidFill>
+                  <a:schemeClr val="bg1"/>
+                </a:solidFill>
+                <a:latin typeface="Times New Roman" panose="02020603050405020304" pitchFamily="18" charset="0"/>
+                <a:cs typeface="Times New Roman" panose="02020603050405020304" pitchFamily="18" charset="0"/>
+              </a:rPr>
+              <a:t>Шашлыка из баранины</a:t>
+            </a:r>
+            <a:endParaRPr lang="ru-RU" dirty="0"/>
+          </a:p>
+        </p:txBody>
+      </p:sp>
+      <p:pic>
+        <p:nvPicPr>
+          <p:cNvPr id="5" name="Объект 4" descr="Технологическая схема приготовления азу"/>
+          <p:cNvPicPr>
+            <a:picLocks noGrp="1"/>
+          </p:cNvPicPr>
+          <p:nvPr>
+            <p:ph idx="1"/>
+          </p:nvPr>
+        </p:nvPicPr>
+        <p:blipFill>
+          <a:blip r:embed="rId2">
+            <a:extLst>
+              <a:ext uri="{28A0092B-C50C-407E-A947-70E740481C1C}">
+                <a14:useLocalDpi xmlns:a14="http://schemas.microsoft.com/office/drawing/2010/main" val="0"/>
+              </a:ext>
+            </a:extLst>
+          </a:blip>
+          <a:srcRect/>
+          <a:stretch>
+            <a:fillRect/>
+          </a:stretch>
+        </p:blipFill>
+        <p:spPr bwMode="auto">
+          <a:xfrm>
+            <a:off x="4613563" y="0"/>
+            <a:ext cx="7578437" cy="6747164"/>
+          </a:xfrm>
+          <a:prstGeom prst="rect">
+            <a:avLst/>
+          </a:prstGeom>
+          <a:noFill/>
+          <a:ln>
+            <a:noFill/>
+          </a:ln>
+        </p:spPr>
+      </p:pic>
+    </p:spTree>
+    <p:extLst>
+      <p:ext uri="{BB962C8B-B14F-4D97-AF65-F5344CB8AC3E}">
+        <p14:creationId xmlns:p14="http://schemas.microsoft.com/office/powerpoint/2010/main" val="1310276386"/>
+      </p:ext>
+    </p:extLst>
+  </p:cSld>
+  <p:clrMapOvr>
+    <a:masterClrMapping/>
+  </p:clrMapOvr>
+</p:sld>
+</file>
+
+<file path=ppt/slides/slide9.xml><?xml version="1.0" encoding="utf-8"?>
+<p:sld xmlns:a="http://schemas.openxmlformats.org/drawingml/2006/main" xmlns:r="http://schemas.openxmlformats.org/officeDocument/2006/relationships" xmlns:p="http://schemas.openxmlformats.org/presentationml/2006/main">
+  <p:cSld>
+    <p:spTree>
+      <p:nvGrpSpPr>
+        <p:cNvPr id="1" name=""/>
+        <p:cNvGrpSpPr/>
+        <p:nvPr/>
+      </p:nvGrpSpPr>
+      <p:grpSpPr>
+        <a:xfrm>
+          <a:off x="0" y="0"/>
+          <a:ext cx="0" cy="0"/>
+          <a:chOff x="0" y="0"/>
+          <a:chExt cx="0" cy="0"/>
+        </a:xfrm>
+      </p:grpSpPr>
+      <p:sp>
+        <p:nvSpPr>
+          <p:cNvPr id="2" name="Заголовок 1"/>
+          <p:cNvSpPr>
+            <a:spLocks noGrp="1"/>
+          </p:cNvSpPr>
+          <p:nvPr>
+            <p:ph type="title"/>
+          </p:nvPr>
+        </p:nvSpPr>
+        <p:spPr>
+          <a:xfrm>
+            <a:off x="749226" y="369136"/>
+            <a:ext cx="10690369" cy="1312315"/>
           </a:xfrm>
         </p:spPr>
         <p:txBody>
@@ -14312,20 +14622,70 @@
           <a:lstStyle/>
           <a:p>
             <a:r>
-              <a:rPr lang="ru-RU" sz="7200" dirty="0">
+              <a:rPr lang="ru-RU" dirty="0">
+                <a:solidFill>
+                  <a:schemeClr val="bg1"/>
+                </a:solidFill>
                 <a:latin typeface="Times New Roman" panose="02020603050405020304" pitchFamily="18" charset="0"/>
                 <a:cs typeface="Times New Roman" panose="02020603050405020304" pitchFamily="18" charset="0"/>
               </a:rPr>
-              <a:t>СПАСИБО ЗА ПРОСМОТР!</a:t>
+              <a:t>ТЕХНОЛОГИЧЕСКИХ СХЕМ ПРИГОТОВЛЕНИЯ </a:t>
             </a:r>
-            <a:endParaRPr lang="ru-RU" sz="7200" dirty="0"/>
+            <a:r>
+              <a:rPr lang="ru-RU" dirty="0" smtClean="0">
+                <a:solidFill>
+                  <a:schemeClr val="bg1"/>
+                </a:solidFill>
+                <a:latin typeface="Times New Roman" panose="02020603050405020304" pitchFamily="18" charset="0"/>
+                <a:cs typeface="Times New Roman" panose="02020603050405020304" pitchFamily="18" charset="0"/>
+              </a:rPr>
+              <a:t>Шашлыка из курицы</a:t>
+            </a:r>
+            <a:endParaRPr lang="ru-RU" dirty="0"/>
           </a:p>
         </p:txBody>
       </p:sp>
+      <p:pic>
+        <p:nvPicPr>
+          <p:cNvPr id="6" name="Объект 5" descr="Разработка технологических схем на блюда, приготавливаемые по  технико-технологическим картам, Разработка технологической схемы,  Аппаратурное оформление технологического процесса - Разработка  производственной программы закусочной на 30 посадочных мест"/>
+          <p:cNvPicPr>
+            <a:picLocks noGrp="1"/>
+          </p:cNvPicPr>
+          <p:nvPr>
+            <p:ph idx="1"/>
+          </p:nvPr>
+        </p:nvPicPr>
+        <p:blipFill>
+          <a:blip r:embed="rId2">
+            <a:extLst>
+              <a:ext uri="{28A0092B-C50C-407E-A947-70E740481C1C}">
+                <a14:useLocalDpi xmlns:a14="http://schemas.microsoft.com/office/drawing/2010/main" val="0"/>
+              </a:ext>
+            </a:extLst>
+          </a:blip>
+          <a:srcRect/>
+          <a:stretch>
+            <a:fillRect/>
+          </a:stretch>
+        </p:blipFill>
+        <p:spPr bwMode="auto">
+          <a:xfrm>
+            <a:off x="3879273" y="1681451"/>
+            <a:ext cx="6262253" cy="5038004"/>
+          </a:xfrm>
+          <a:prstGeom prst="rect">
+            <a:avLst/>
+          </a:prstGeom>
+          <a:noFill/>
+          <a:ln>
+            <a:noFill/>
+          </a:ln>
+        </p:spPr>
+      </p:pic>
     </p:spTree>
     <p:extLst>
       <p:ext uri="{BB962C8B-B14F-4D97-AF65-F5344CB8AC3E}">
-        <p14:creationId xmlns:p14="http://schemas.microsoft.com/office/powerpoint/2010/main" val="3590306646"/>
+        <p14:creationId xmlns:p14="http://schemas.microsoft.com/office/powerpoint/2010/main" val="2572246885"/>
       </p:ext>
     </p:extLst>
   </p:cSld>

</xml_diff>